<commit_message>
Added visualization for rules
</commit_message>
<xml_diff>
--- a/R/Ai_Presentation.pptx
+++ b/R/Ai_Presentation.pptx
@@ -8,6 +8,7 @@
     <p:sldId id="258" r:id="rId2"/>
     <p:sldId id="257" r:id="rId3"/>
     <p:sldId id="260" r:id="rId4"/>
+    <p:sldId id="261" r:id="rId5"/>
   </p:sldIdLst>
   <p:sldSz cx="9144000" cy="6858000" type="screen4x3"/>
   <p:notesSz cx="6858000" cy="9144000"/>
@@ -215,11 +216,11 @@
           <c:showBubbleSize val="0"/>
         </c:dLbls>
         <c:gapWidth val="150"/>
-        <c:axId val="-2091783784"/>
-        <c:axId val="-2077572808"/>
+        <c:axId val="2138201816"/>
+        <c:axId val="2138187544"/>
       </c:barChart>
       <c:catAx>
-        <c:axId val="-2091783784"/>
+        <c:axId val="2138201816"/>
         <c:scaling>
           <c:orientation val="minMax"/>
         </c:scaling>
@@ -252,7 +253,7 @@
         <c:majorTickMark val="none"/>
         <c:minorTickMark val="none"/>
         <c:tickLblPos val="nextTo"/>
-        <c:crossAx val="-2077572808"/>
+        <c:crossAx val="2138187544"/>
         <c:crosses val="autoZero"/>
         <c:auto val="1"/>
         <c:lblAlgn val="ctr"/>
@@ -260,7 +261,7 @@
         <c:noMultiLvlLbl val="0"/>
       </c:catAx>
       <c:valAx>
-        <c:axId val="-2077572808"/>
+        <c:axId val="2138187544"/>
         <c:scaling>
           <c:orientation val="minMax"/>
         </c:scaling>
@@ -295,7 +296,7 @@
         <c:majorTickMark val="out"/>
         <c:minorTickMark val="none"/>
         <c:tickLblPos val="nextTo"/>
-        <c:crossAx val="-2091783784"/>
+        <c:crossAx val="2138201816"/>
         <c:crosses val="autoZero"/>
         <c:crossBetween val="between"/>
       </c:valAx>
@@ -497,7 +498,7 @@
           <a:p>
             <a:fld id="{226D7249-141A-1140-9B64-B25EFD58BFFE}" type="datetimeFigureOut">
               <a:rPr lang="en-US" smtClean="0"/>
-              <a:t>12/1/14</a:t>
+              <a:t>12/2/14</a:t>
             </a:fld>
             <a:endParaRPr lang="en-US"/>
           </a:p>
@@ -667,7 +668,7 @@
           <a:p>
             <a:fld id="{226D7249-141A-1140-9B64-B25EFD58BFFE}" type="datetimeFigureOut">
               <a:rPr lang="en-US" smtClean="0"/>
-              <a:t>12/1/14</a:t>
+              <a:t>12/2/14</a:t>
             </a:fld>
             <a:endParaRPr lang="en-US"/>
           </a:p>
@@ -847,7 +848,7 @@
           <a:p>
             <a:fld id="{226D7249-141A-1140-9B64-B25EFD58BFFE}" type="datetimeFigureOut">
               <a:rPr lang="en-US" smtClean="0"/>
-              <a:t>12/1/14</a:t>
+              <a:t>12/2/14</a:t>
             </a:fld>
             <a:endParaRPr lang="en-US"/>
           </a:p>
@@ -1017,7 +1018,7 @@
           <a:p>
             <a:fld id="{226D7249-141A-1140-9B64-B25EFD58BFFE}" type="datetimeFigureOut">
               <a:rPr lang="en-US" smtClean="0"/>
-              <a:t>12/1/14</a:t>
+              <a:t>12/2/14</a:t>
             </a:fld>
             <a:endParaRPr lang="en-US"/>
           </a:p>
@@ -1263,7 +1264,7 @@
           <a:p>
             <a:fld id="{226D7249-141A-1140-9B64-B25EFD58BFFE}" type="datetimeFigureOut">
               <a:rPr lang="en-US" smtClean="0"/>
-              <a:t>12/1/14</a:t>
+              <a:t>12/2/14</a:t>
             </a:fld>
             <a:endParaRPr lang="en-US"/>
           </a:p>
@@ -1551,7 +1552,7 @@
           <a:p>
             <a:fld id="{226D7249-141A-1140-9B64-B25EFD58BFFE}" type="datetimeFigureOut">
               <a:rPr lang="en-US" smtClean="0"/>
-              <a:t>12/1/14</a:t>
+              <a:t>12/2/14</a:t>
             </a:fld>
             <a:endParaRPr lang="en-US"/>
           </a:p>
@@ -1973,7 +1974,7 @@
           <a:p>
             <a:fld id="{226D7249-141A-1140-9B64-B25EFD58BFFE}" type="datetimeFigureOut">
               <a:rPr lang="en-US" smtClean="0"/>
-              <a:t>12/1/14</a:t>
+              <a:t>12/2/14</a:t>
             </a:fld>
             <a:endParaRPr lang="en-US"/>
           </a:p>
@@ -2091,7 +2092,7 @@
           <a:p>
             <a:fld id="{226D7249-141A-1140-9B64-B25EFD58BFFE}" type="datetimeFigureOut">
               <a:rPr lang="en-US" smtClean="0"/>
-              <a:t>12/1/14</a:t>
+              <a:t>12/2/14</a:t>
             </a:fld>
             <a:endParaRPr lang="en-US"/>
           </a:p>
@@ -2186,7 +2187,7 @@
           <a:p>
             <a:fld id="{226D7249-141A-1140-9B64-B25EFD58BFFE}" type="datetimeFigureOut">
               <a:rPr lang="en-US" smtClean="0"/>
-              <a:t>12/1/14</a:t>
+              <a:t>12/2/14</a:t>
             </a:fld>
             <a:endParaRPr lang="en-US"/>
           </a:p>
@@ -2463,7 +2464,7 @@
           <a:p>
             <a:fld id="{226D7249-141A-1140-9B64-B25EFD58BFFE}" type="datetimeFigureOut">
               <a:rPr lang="en-US" smtClean="0"/>
-              <a:t>12/1/14</a:t>
+              <a:t>12/2/14</a:t>
             </a:fld>
             <a:endParaRPr lang="en-US"/>
           </a:p>
@@ -2716,7 +2717,7 @@
           <a:p>
             <a:fld id="{226D7249-141A-1140-9B64-B25EFD58BFFE}" type="datetimeFigureOut">
               <a:rPr lang="en-US" smtClean="0"/>
-              <a:t>12/1/14</a:t>
+              <a:t>12/2/14</a:t>
             </a:fld>
             <a:endParaRPr lang="en-US"/>
           </a:p>
@@ -2929,7 +2930,7 @@
           <a:p>
             <a:fld id="{226D7249-141A-1140-9B64-B25EFD58BFFE}" type="datetimeFigureOut">
               <a:rPr lang="en-US" smtClean="0"/>
-              <a:t>12/1/14</a:t>
+              <a:t>12/2/14</a:t>
             </a:fld>
             <a:endParaRPr lang="en-US"/>
           </a:p>
@@ -3598,6 +3599,127 @@
     <p:extLst>
       <p:ext uri="{BB962C8B-B14F-4D97-AF65-F5344CB8AC3E}">
         <p14:creationId xmlns:p14="http://schemas.microsoft.com/office/powerpoint/2010/main" val="200227949"/>
+      </p:ext>
+    </p:extLst>
+  </p:cSld>
+  <p:clrMapOvr>
+    <a:masterClrMapping/>
+  </p:clrMapOvr>
+</p:sld>
+</file>
+
+<file path=ppt/slides/slide4.xml><?xml version="1.0" encoding="utf-8"?>
+<p:sld xmlns:a="http://schemas.openxmlformats.org/drawingml/2006/main" xmlns:r="http://schemas.openxmlformats.org/officeDocument/2006/relationships" xmlns:p="http://schemas.openxmlformats.org/presentationml/2006/main">
+  <p:cSld>
+    <p:spTree>
+      <p:nvGrpSpPr>
+        <p:cNvPr id="1" name=""/>
+        <p:cNvGrpSpPr/>
+        <p:nvPr/>
+      </p:nvGrpSpPr>
+      <p:grpSpPr>
+        <a:xfrm>
+          <a:off x="0" y="0"/>
+          <a:ext cx="0" cy="0"/>
+          <a:chOff x="0" y="0"/>
+          <a:chExt cx="0" cy="0"/>
+        </a:xfrm>
+      </p:grpSpPr>
+      <p:sp>
+        <p:nvSpPr>
+          <p:cNvPr id="2" name="Title 1"/>
+          <p:cNvSpPr>
+            <a:spLocks noGrp="1"/>
+          </p:cNvSpPr>
+          <p:nvPr>
+            <p:ph type="title"/>
+          </p:nvPr>
+        </p:nvSpPr>
+        <p:spPr/>
+        <p:txBody>
+          <a:bodyPr/>
+          <a:lstStyle/>
+          <a:p>
+            <a:r>
+              <a:rPr lang="en-US" dirty="0" smtClean="0"/>
+              <a:t>Rules Visualization with </a:t>
+            </a:r>
+            <a:r>
+              <a:rPr lang="en-US" dirty="0" err="1" smtClean="0"/>
+              <a:t>arulesViz</a:t>
+            </a:r>
+            <a:endParaRPr lang="en-US" dirty="0"/>
+          </a:p>
+        </p:txBody>
+      </p:sp>
+      <p:sp>
+        <p:nvSpPr>
+          <p:cNvPr id="3" name="Content Placeholder 2"/>
+          <p:cNvSpPr>
+            <a:spLocks noGrp="1"/>
+          </p:cNvSpPr>
+          <p:nvPr>
+            <p:ph idx="1"/>
+          </p:nvPr>
+        </p:nvSpPr>
+        <p:spPr/>
+        <p:txBody>
+          <a:bodyPr/>
+          <a:lstStyle/>
+          <a:p>
+            <a:r>
+              <a:rPr lang="en-US" dirty="0" smtClean="0"/>
+              <a:t>37 rules : min support = 1%, min confidence = 30%</a:t>
+            </a:r>
+          </a:p>
+          <a:p>
+            <a:r>
+              <a:rPr lang="en-US" dirty="0" smtClean="0"/>
+              <a:t>Visualization types:</a:t>
+            </a:r>
+          </a:p>
+          <a:p>
+            <a:pPr lvl="1"/>
+            <a:r>
+              <a:rPr lang="en-US" dirty="0" smtClean="0"/>
+              <a:t>Scatter plot</a:t>
+            </a:r>
+          </a:p>
+          <a:p>
+            <a:pPr lvl="1"/>
+            <a:r>
+              <a:rPr lang="en-US" dirty="0" smtClean="0"/>
+              <a:t>Matrix (3DMatrix)</a:t>
+            </a:r>
+          </a:p>
+          <a:p>
+            <a:pPr lvl="1"/>
+            <a:r>
+              <a:rPr lang="en-US" dirty="0" smtClean="0"/>
+              <a:t>Grouped</a:t>
+            </a:r>
+          </a:p>
+          <a:p>
+            <a:pPr lvl="1"/>
+            <a:r>
+              <a:rPr lang="en-US" dirty="0" smtClean="0"/>
+              <a:t>Graph</a:t>
+            </a:r>
+          </a:p>
+          <a:p>
+            <a:pPr lvl="1"/>
+            <a:r>
+              <a:rPr lang="en-US" dirty="0" smtClean="0"/>
+              <a:t>Parallel coordinate</a:t>
+            </a:r>
+            <a:endParaRPr lang="en-US" dirty="0"/>
+          </a:p>
+        </p:txBody>
+      </p:sp>
+    </p:spTree>
+    <p:extLst>
+      <p:ext uri="{BB962C8B-B14F-4D97-AF65-F5344CB8AC3E}">
+        <p14:creationId xmlns:p14="http://schemas.microsoft.com/office/powerpoint/2010/main" val="3059337594"/>
       </p:ext>
     </p:extLst>
   </p:cSld>

</xml_diff>

<commit_message>
Included changes without front-page
</commit_message>
<xml_diff>
--- a/R/Ai_Presentation.pptx
+++ b/R/Ai_Presentation.pptx
@@ -8,7 +8,13 @@
     <p:sldId id="258" r:id="rId2"/>
     <p:sldId id="257" r:id="rId3"/>
     <p:sldId id="260" r:id="rId4"/>
-    <p:sldId id="261" r:id="rId5"/>
+    <p:sldId id="267" r:id="rId5"/>
+    <p:sldId id="266" r:id="rId6"/>
+    <p:sldId id="261" r:id="rId7"/>
+    <p:sldId id="262" r:id="rId8"/>
+    <p:sldId id="265" r:id="rId9"/>
+    <p:sldId id="264" r:id="rId10"/>
+    <p:sldId id="263" r:id="rId11"/>
   </p:sldIdLst>
   <p:sldSz cx="9144000" cy="6858000" type="screen4x3"/>
   <p:notesSz cx="6858000" cy="9144000"/>
@@ -216,11 +222,11 @@
           <c:showBubbleSize val="0"/>
         </c:dLbls>
         <c:gapWidth val="150"/>
-        <c:axId val="2138201816"/>
-        <c:axId val="2138187544"/>
+        <c:axId val="2108307224"/>
+        <c:axId val="2107862472"/>
       </c:barChart>
       <c:catAx>
-        <c:axId val="2138201816"/>
+        <c:axId val="2108307224"/>
         <c:scaling>
           <c:orientation val="minMax"/>
         </c:scaling>
@@ -236,14 +242,14 @@
                   <a:defRPr/>
                 </a:pPr>
                 <a:r>
-                  <a:rPr lang="en-US"/>
+                  <a:rPr lang="en-US" dirty="0"/>
                   <a:t>Itemset</a:t>
                 </a:r>
                 <a:r>
-                  <a:rPr lang="en-US" baseline="0"/>
+                  <a:rPr lang="en-US" baseline="0" dirty="0"/>
                   <a:t> Size</a:t>
                 </a:r>
-                <a:endParaRPr lang="en-US"/>
+                <a:endParaRPr lang="en-US" dirty="0"/>
               </a:p>
             </c:rich>
           </c:tx>
@@ -253,7 +259,7 @@
         <c:majorTickMark val="none"/>
         <c:minorTickMark val="none"/>
         <c:tickLblPos val="nextTo"/>
-        <c:crossAx val="2138187544"/>
+        <c:crossAx val="2107862472"/>
         <c:crosses val="autoZero"/>
         <c:auto val="1"/>
         <c:lblAlgn val="ctr"/>
@@ -261,7 +267,7 @@
         <c:noMultiLvlLbl val="0"/>
       </c:catAx>
       <c:valAx>
-        <c:axId val="2138187544"/>
+        <c:axId val="2107862472"/>
         <c:scaling>
           <c:orientation val="minMax"/>
         </c:scaling>
@@ -296,7 +302,7 @@
         <c:majorTickMark val="out"/>
         <c:minorTickMark val="none"/>
         <c:tickLblPos val="nextTo"/>
-        <c:crossAx val="2138201816"/>
+        <c:crossAx val="2108307224"/>
         <c:crosses val="autoZero"/>
         <c:crossBetween val="between"/>
       </c:valAx>
@@ -306,6 +312,201 @@
           <a:noFill/>
         </a:ln>
       </c:spPr>
+    </c:plotArea>
+    <c:plotVisOnly val="1"/>
+    <c:dispBlanksAs val="gap"/>
+    <c:showDLblsOverMax val="0"/>
+  </c:chart>
+  <c:externalData r:id="rId1">
+    <c:autoUpdate val="0"/>
+  </c:externalData>
+</c:chartSpace>
+</file>
+
+<file path=ppt/charts/chart2.xml><?xml version="1.0" encoding="utf-8"?>
+<c:chartSpace xmlns:c="http://schemas.openxmlformats.org/drawingml/2006/chart" xmlns:a="http://schemas.openxmlformats.org/drawingml/2006/main" xmlns:r="http://schemas.openxmlformats.org/officeDocument/2006/relationships">
+  <c:date1904 val="0"/>
+  <c:lang val="en-US"/>
+  <c:roundedCorners val="0"/>
+  <mc:AlternateContent xmlns:mc="http://schemas.openxmlformats.org/markup-compatibility/2006">
+    <mc:Choice xmlns:c14="http://schemas.microsoft.com/office/drawing/2007/8/2/chart" Requires="c14">
+      <c14:style val="117"/>
+    </mc:Choice>
+    <mc:Fallback>
+      <c:style val="17"/>
+    </mc:Fallback>
+  </mc:AlternateContent>
+  <c:chart>
+    <c:title>
+      <c:tx>
+        <c:rich>
+          <a:bodyPr/>
+          <a:lstStyle/>
+          <a:p>
+            <a:pPr>
+              <a:defRPr/>
+            </a:pPr>
+            <a:endParaRPr lang="en-US" dirty="0"/>
+          </a:p>
+        </c:rich>
+      </c:tx>
+      <c:layout/>
+      <c:overlay val="0"/>
+    </c:title>
+    <c:autoTitleDeleted val="0"/>
+    <c:plotArea>
+      <c:layout/>
+      <c:barChart>
+        <c:barDir val="col"/>
+        <c:grouping val="clustered"/>
+        <c:varyColors val="0"/>
+        <c:ser>
+          <c:idx val="0"/>
+          <c:order val="0"/>
+          <c:tx>
+            <c:strRef>
+              <c:f>'Itemset Width Distribution'!$A$22</c:f>
+              <c:strCache>
+                <c:ptCount val="1"/>
+                <c:pt idx="0">
+                  <c:v>Size</c:v>
+                </c:pt>
+              </c:strCache>
+            </c:strRef>
+          </c:tx>
+          <c:invertIfNegative val="0"/>
+          <c:val>
+            <c:numRef>
+              <c:f>'Itemset Width Distribution'!$C$23:$C$35</c:f>
+              <c:numCache>
+                <c:formatCode>0.00%</c:formatCode>
+                <c:ptCount val="13"/>
+                <c:pt idx="0">
+                  <c:v>0.72660673300455</c:v>
+                </c:pt>
+                <c:pt idx="1">
+                  <c:v>0.177677247918751</c:v>
+                </c:pt>
+                <c:pt idx="2">
+                  <c:v>0.0602243152532303</c:v>
+                </c:pt>
+                <c:pt idx="3">
+                  <c:v>0.0219379076225509</c:v>
+                </c:pt>
+                <c:pt idx="4">
+                  <c:v>0.00841366936777031</c:v>
+                </c:pt>
+                <c:pt idx="5">
+                  <c:v>0.00311836331740653</c:v>
+                </c:pt>
+                <c:pt idx="6">
+                  <c:v>0.00132419598691765</c:v>
+                </c:pt>
+                <c:pt idx="7">
+                  <c:v>0.000447802883968804</c:v>
+                </c:pt>
+                <c:pt idx="8">
+                  <c:v>0.000164046601057879</c:v>
+                </c:pt>
+                <c:pt idx="9">
+                  <c:v>5.32043030457986E-5</c:v>
+                </c:pt>
+                <c:pt idx="10">
+                  <c:v>2.66021515228993E-5</c:v>
+                </c:pt>
+                <c:pt idx="11">
+                  <c:v>4.43369192048321E-6</c:v>
+                </c:pt>
+                <c:pt idx="12">
+                  <c:v>1.47789730682774E-6</c:v>
+                </c:pt>
+              </c:numCache>
+            </c:numRef>
+          </c:val>
+        </c:ser>
+        <c:dLbls>
+          <c:showLegendKey val="0"/>
+          <c:showVal val="0"/>
+          <c:showCatName val="0"/>
+          <c:showSerName val="0"/>
+          <c:showPercent val="0"/>
+          <c:showBubbleSize val="0"/>
+        </c:dLbls>
+        <c:gapWidth val="150"/>
+        <c:axId val="-2132844344"/>
+        <c:axId val="2107651448"/>
+      </c:barChart>
+      <c:catAx>
+        <c:axId val="-2132844344"/>
+        <c:scaling>
+          <c:orientation val="minMax"/>
+        </c:scaling>
+        <c:delete val="0"/>
+        <c:axPos val="b"/>
+        <c:title>
+          <c:tx>
+            <c:rich>
+              <a:bodyPr/>
+              <a:lstStyle/>
+              <a:p>
+                <a:pPr>
+                  <a:defRPr/>
+                </a:pPr>
+                <a:r>
+                  <a:rPr lang="en-US" dirty="0"/>
+                  <a:t>Itemset Size</a:t>
+                </a:r>
+              </a:p>
+            </c:rich>
+          </c:tx>
+          <c:layout/>
+          <c:overlay val="0"/>
+        </c:title>
+        <c:majorTickMark val="none"/>
+        <c:minorTickMark val="none"/>
+        <c:tickLblPos val="nextTo"/>
+        <c:crossAx val="2107651448"/>
+        <c:crosses val="autoZero"/>
+        <c:auto val="1"/>
+        <c:lblAlgn val="ctr"/>
+        <c:lblOffset val="100"/>
+        <c:noMultiLvlLbl val="0"/>
+      </c:catAx>
+      <c:valAx>
+        <c:axId val="2107651448"/>
+        <c:scaling>
+          <c:orientation val="minMax"/>
+        </c:scaling>
+        <c:delete val="0"/>
+        <c:axPos val="l"/>
+        <c:majorGridlines/>
+        <c:title>
+          <c:tx>
+            <c:rich>
+              <a:bodyPr/>
+              <a:lstStyle/>
+              <a:p>
+                <a:pPr>
+                  <a:defRPr/>
+                </a:pPr>
+                <a:r>
+                  <a:rPr lang="en-US"/>
+                  <a:t>Support (%)</a:t>
+                </a:r>
+              </a:p>
+            </c:rich>
+          </c:tx>
+          <c:layout/>
+          <c:overlay val="0"/>
+        </c:title>
+        <c:numFmt formatCode="0.00%" sourceLinked="1"/>
+        <c:majorTickMark val="out"/>
+        <c:minorTickMark val="none"/>
+        <c:tickLblPos val="nextTo"/>
+        <c:crossAx val="-2132844344"/>
+        <c:crosses val="autoZero"/>
+        <c:crossBetween val="between"/>
+      </c:valAx>
     </c:plotArea>
     <c:plotVisOnly val="1"/>
     <c:dispBlanksAs val="gap"/>
@@ -3383,14 +3584,66 @@
           <a:p>
             <a:r>
               <a:rPr lang="en-US" dirty="0" smtClean="0"/>
-              <a:t>Page visits concentrates in 7 out of 17 categories (support threshold = 1%):</a:t>
+              <a:t>Page visits concentrates in </a:t>
+            </a:r>
+            <a:r>
+              <a:rPr lang="en-US" dirty="0" smtClean="0"/>
+              <a:t>9 </a:t>
+            </a:r>
+            <a:r>
+              <a:rPr lang="en-US" dirty="0" smtClean="0"/>
+              <a:t>out of 17 categories (support threshold = </a:t>
+            </a:r>
+            <a:r>
+              <a:rPr lang="en-US" dirty="0" smtClean="0"/>
+              <a:t>10%</a:t>
+            </a:r>
+            <a:r>
+              <a:rPr lang="en-US" dirty="0" smtClean="0"/>
+              <a:t>):</a:t>
             </a:r>
           </a:p>
           <a:p>
             <a:pPr lvl="1"/>
             <a:r>
               <a:rPr lang="en-US" dirty="0" smtClean="0"/>
-              <a:t>Frequent categories: Front Page, On-Air, News, Local, Tech, Sports, and Business.  (support &gt;= 1%) </a:t>
+              <a:t>Top 5 frequent </a:t>
+            </a:r>
+            <a:r>
+              <a:rPr lang="en-US" dirty="0" smtClean="0"/>
+              <a:t>categories: </a:t>
+            </a:r>
+            <a:r>
+              <a:rPr lang="en-US" dirty="0" smtClean="0"/>
+              <a:t>On</a:t>
+            </a:r>
+            <a:r>
+              <a:rPr lang="en-US" dirty="0" smtClean="0"/>
+              <a:t>-Air, News, </a:t>
+            </a:r>
+            <a:r>
+              <a:rPr lang="en-US" dirty="0" smtClean="0"/>
+              <a:t>Tech</a:t>
+            </a:r>
+            <a:r>
+              <a:rPr lang="en-US" dirty="0" smtClean="0"/>
+              <a:t>, </a:t>
+            </a:r>
+            <a:r>
+              <a:rPr lang="en-US" dirty="0" smtClean="0"/>
+              <a:t>Weather, Local </a:t>
+            </a:r>
+            <a:r>
+              <a:rPr lang="en-US" dirty="0" smtClean="0"/>
+              <a:t>Business.  (support &gt;= </a:t>
+            </a:r>
+            <a:r>
+              <a:rPr lang="en-US" dirty="0" smtClean="0"/>
+              <a:t>12%</a:t>
+            </a:r>
+            <a:r>
+              <a:rPr lang="en-US" dirty="0" smtClean="0"/>
+              <a:t>) </a:t>
             </a:r>
           </a:p>
           <a:p>
@@ -3410,21 +3663,37 @@
             <a:pPr lvl="1"/>
             <a:r>
               <a:rPr lang="en-US" dirty="0" smtClean="0"/>
-              <a:t>61% with size = 1 </a:t>
+              <a:t>73% </a:t>
+            </a:r>
+            <a:r>
+              <a:rPr lang="en-US" dirty="0" smtClean="0"/>
+              <a:t>with size = 1 </a:t>
             </a:r>
           </a:p>
           <a:p>
             <a:pPr lvl="1"/>
             <a:r>
               <a:rPr lang="en-US" dirty="0" smtClean="0"/>
-              <a:t>31% with size = 2 </a:t>
+              <a:t>18% </a:t>
+            </a:r>
+            <a:r>
+              <a:rPr lang="en-US" dirty="0" smtClean="0"/>
+              <a:t>with size = 2 </a:t>
             </a:r>
           </a:p>
           <a:p>
             <a:pPr lvl="1"/>
             <a:r>
               <a:rPr lang="en-US" dirty="0" smtClean="0"/>
-              <a:t>  8% with size &gt;= 3</a:t>
+              <a:t>  </a:t>
+            </a:r>
+            <a:r>
+              <a:rPr lang="en-US" dirty="0" smtClean="0"/>
+              <a:t>9% </a:t>
+            </a:r>
+            <a:r>
+              <a:rPr lang="en-US" dirty="0" smtClean="0"/>
+              <a:t>with size &gt;= 3</a:t>
             </a:r>
           </a:p>
           <a:p>
@@ -3436,6 +3705,66 @@
     <p:extLst>
       <p:ext uri="{BB962C8B-B14F-4D97-AF65-F5344CB8AC3E}">
         <p14:creationId xmlns:p14="http://schemas.microsoft.com/office/powerpoint/2010/main" val="1272378282"/>
+      </p:ext>
+    </p:extLst>
+  </p:cSld>
+  <p:clrMapOvr>
+    <a:masterClrMapping/>
+  </p:clrMapOvr>
+</p:sld>
+</file>
+
+<file path=ppt/slides/slide10.xml><?xml version="1.0" encoding="utf-8"?>
+<p:sld xmlns:a="http://schemas.openxmlformats.org/drawingml/2006/main" xmlns:r="http://schemas.openxmlformats.org/officeDocument/2006/relationships" xmlns:p="http://schemas.openxmlformats.org/presentationml/2006/main">
+  <p:cSld>
+    <p:spTree>
+      <p:nvGrpSpPr>
+        <p:cNvPr id="1" name=""/>
+        <p:cNvGrpSpPr/>
+        <p:nvPr/>
+      </p:nvGrpSpPr>
+      <p:grpSpPr>
+        <a:xfrm>
+          <a:off x="0" y="0"/>
+          <a:ext cx="0" cy="0"/>
+          <a:chOff x="0" y="0"/>
+          <a:chExt cx="0" cy="0"/>
+        </a:xfrm>
+      </p:grpSpPr>
+      <p:pic>
+        <p:nvPicPr>
+          <p:cNvPr id="5" name="Content Placeholder 4" descr="paracoord.png"/>
+          <p:cNvPicPr>
+            <a:picLocks noGrp="1" noChangeAspect="1"/>
+          </p:cNvPicPr>
+          <p:nvPr>
+            <p:ph idx="1"/>
+          </p:nvPr>
+        </p:nvPicPr>
+        <p:blipFill>
+          <a:blip r:embed="rId2">
+            <a:extLst>
+              <a:ext uri="{28A0092B-C50C-407E-A947-70E740481C1C}">
+                <a14:useLocalDpi xmlns:a14="http://schemas.microsoft.com/office/drawing/2010/main" val="0"/>
+              </a:ext>
+            </a:extLst>
+          </a:blip>
+          <a:srcRect l="-4290" r="-4290"/>
+          <a:stretch>
+            <a:fillRect/>
+          </a:stretch>
+        </p:blipFill>
+        <p:spPr>
+          <a:xfrm>
+            <a:off x="457200" y="446088"/>
+            <a:ext cx="8229600" cy="5962650"/>
+          </a:xfrm>
+        </p:spPr>
+      </p:pic>
+    </p:spTree>
+    <p:extLst>
+      <p:ext uri="{BB962C8B-B14F-4D97-AF65-F5344CB8AC3E}">
+        <p14:creationId xmlns:p14="http://schemas.microsoft.com/office/powerpoint/2010/main" val="2066305365"/>
       </p:ext>
     </p:extLst>
   </p:cSld>
@@ -3559,12 +3888,8 @@
           <a:lstStyle/>
           <a:p>
             <a:r>
-              <a:rPr lang="en-US" dirty="0" err="1" smtClean="0"/>
-              <a:t>Itemset</a:t>
-            </a:r>
-            <a:r>
               <a:rPr lang="en-US" dirty="0" smtClean="0"/>
-              <a:t> Size Distribution</a:t>
+              <a:t>Itemset Size Distribution</a:t>
             </a:r>
             <a:endParaRPr lang="en-US" dirty="0"/>
           </a:p>
@@ -3642,6 +3967,182 @@
           <a:p>
             <a:r>
               <a:rPr lang="en-US" dirty="0" smtClean="0"/>
+              <a:t>Item Frequency</a:t>
+            </a:r>
+            <a:endParaRPr lang="en-US" dirty="0"/>
+          </a:p>
+        </p:txBody>
+      </p:sp>
+      <p:pic>
+        <p:nvPicPr>
+          <p:cNvPr id="6" name="Content Placeholder 5" descr="item_frequency_wo_frontpage.png"/>
+          <p:cNvPicPr>
+            <a:picLocks noGrp="1" noChangeAspect="1"/>
+          </p:cNvPicPr>
+          <p:nvPr>
+            <p:ph idx="1"/>
+          </p:nvPr>
+        </p:nvPicPr>
+        <p:blipFill rotWithShape="1">
+          <a:blip r:embed="rId2">
+            <a:extLst>
+              <a:ext uri="{28A0092B-C50C-407E-A947-70E740481C1C}">
+                <a14:useLocalDpi xmlns:a14="http://schemas.microsoft.com/office/drawing/2010/main" val="0"/>
+              </a:ext>
+            </a:extLst>
+          </a:blip>
+          <a:srcRect t="12462"/>
+          <a:stretch/>
+        </p:blipFill>
+        <p:spPr>
+          <a:xfrm>
+            <a:off x="754042" y="1394965"/>
+            <a:ext cx="7570185" cy="5213343"/>
+          </a:xfrm>
+        </p:spPr>
+      </p:pic>
+    </p:spTree>
+    <p:extLst>
+      <p:ext uri="{BB962C8B-B14F-4D97-AF65-F5344CB8AC3E}">
+        <p14:creationId xmlns:p14="http://schemas.microsoft.com/office/powerpoint/2010/main" val="673302601"/>
+      </p:ext>
+    </p:extLst>
+  </p:cSld>
+  <p:clrMapOvr>
+    <a:masterClrMapping/>
+  </p:clrMapOvr>
+</p:sld>
+</file>
+
+<file path=ppt/slides/slide5.xml><?xml version="1.0" encoding="utf-8"?>
+<p:sld xmlns:a="http://schemas.openxmlformats.org/drawingml/2006/main" xmlns:r="http://schemas.openxmlformats.org/officeDocument/2006/relationships" xmlns:p="http://schemas.openxmlformats.org/presentationml/2006/main">
+  <p:cSld>
+    <p:spTree>
+      <p:nvGrpSpPr>
+        <p:cNvPr id="1" name=""/>
+        <p:cNvGrpSpPr/>
+        <p:nvPr/>
+      </p:nvGrpSpPr>
+      <p:grpSpPr>
+        <a:xfrm>
+          <a:off x="0" y="0"/>
+          <a:ext cx="0" cy="0"/>
+          <a:chOff x="0" y="0"/>
+          <a:chExt cx="0" cy="0"/>
+        </a:xfrm>
+      </p:grpSpPr>
+      <p:sp>
+        <p:nvSpPr>
+          <p:cNvPr id="2" name="Title 1"/>
+          <p:cNvSpPr>
+            <a:spLocks noGrp="1"/>
+          </p:cNvSpPr>
+          <p:nvPr>
+            <p:ph type="title"/>
+          </p:nvPr>
+        </p:nvSpPr>
+        <p:spPr/>
+        <p:txBody>
+          <a:bodyPr>
+            <a:normAutofit fontScale="90000"/>
+          </a:bodyPr>
+          <a:lstStyle/>
+          <a:p>
+            <a:r>
+              <a:rPr lang="en-US" dirty="0" smtClean="0"/>
+              <a:t>Itemset Size Distribution</a:t>
+            </a:r>
+            <a:br>
+              <a:rPr lang="en-US" dirty="0" smtClean="0"/>
+            </a:br>
+            <a:r>
+              <a:rPr lang="en-US" dirty="0" smtClean="0"/>
+              <a:t>without “</a:t>
+            </a:r>
+            <a:r>
+              <a:rPr lang="en-US" dirty="0" err="1" smtClean="0"/>
+              <a:t>frontpage</a:t>
+            </a:r>
+            <a:r>
+              <a:rPr lang="en-US" dirty="0" smtClean="0"/>
+              <a:t>”</a:t>
+            </a:r>
+            <a:endParaRPr lang="en-US" dirty="0"/>
+          </a:p>
+        </p:txBody>
+      </p:sp>
+      <p:graphicFrame>
+        <p:nvGraphicFramePr>
+          <p:cNvPr id="4" name="Content Placeholder 3"/>
+          <p:cNvGraphicFramePr>
+            <a:graphicFrameLocks noGrp="1"/>
+          </p:cNvGraphicFramePr>
+          <p:nvPr>
+            <p:ph idx="1"/>
+            <p:extLst>
+              <p:ext uri="{D42A27DB-BD31-4B8C-83A1-F6EECF244321}">
+                <p14:modId xmlns:p14="http://schemas.microsoft.com/office/powerpoint/2010/main" val="1746460325"/>
+              </p:ext>
+            </p:extLst>
+          </p:nvPr>
+        </p:nvGraphicFramePr>
+        <p:xfrm>
+          <a:off x="457200" y="1600200"/>
+          <a:ext cx="8229600" cy="4525963"/>
+        </p:xfrm>
+        <a:graphic>
+          <a:graphicData uri="http://schemas.openxmlformats.org/drawingml/2006/chart">
+            <c:chart xmlns:c="http://schemas.openxmlformats.org/drawingml/2006/chart" xmlns:r="http://schemas.openxmlformats.org/officeDocument/2006/relationships" r:id="rId2"/>
+          </a:graphicData>
+        </a:graphic>
+      </p:graphicFrame>
+    </p:spTree>
+    <p:extLst>
+      <p:ext uri="{BB962C8B-B14F-4D97-AF65-F5344CB8AC3E}">
+        <p14:creationId xmlns:p14="http://schemas.microsoft.com/office/powerpoint/2010/main" val="388456681"/>
+      </p:ext>
+    </p:extLst>
+  </p:cSld>
+  <p:clrMapOvr>
+    <a:masterClrMapping/>
+  </p:clrMapOvr>
+</p:sld>
+</file>
+
+<file path=ppt/slides/slide6.xml><?xml version="1.0" encoding="utf-8"?>
+<p:sld xmlns:a="http://schemas.openxmlformats.org/drawingml/2006/main" xmlns:r="http://schemas.openxmlformats.org/officeDocument/2006/relationships" xmlns:p="http://schemas.openxmlformats.org/presentationml/2006/main">
+  <p:cSld>
+    <p:spTree>
+      <p:nvGrpSpPr>
+        <p:cNvPr id="1" name=""/>
+        <p:cNvGrpSpPr/>
+        <p:nvPr/>
+      </p:nvGrpSpPr>
+      <p:grpSpPr>
+        <a:xfrm>
+          <a:off x="0" y="0"/>
+          <a:ext cx="0" cy="0"/>
+          <a:chOff x="0" y="0"/>
+          <a:chExt cx="0" cy="0"/>
+        </a:xfrm>
+      </p:grpSpPr>
+      <p:sp>
+        <p:nvSpPr>
+          <p:cNvPr id="2" name="Title 1"/>
+          <p:cNvSpPr>
+            <a:spLocks noGrp="1"/>
+          </p:cNvSpPr>
+          <p:nvPr>
+            <p:ph type="title"/>
+          </p:nvPr>
+        </p:nvSpPr>
+        <p:spPr/>
+        <p:txBody>
+          <a:bodyPr/>
+          <a:lstStyle/>
+          <a:p>
+            <a:r>
+              <a:rPr lang="en-US" dirty="0" smtClean="0"/>
               <a:t>Rules Visualization with </a:t>
             </a:r>
             <a:r>
@@ -3669,7 +4170,19 @@
           <a:p>
             <a:r>
               <a:rPr lang="en-US" dirty="0" smtClean="0"/>
-              <a:t>37 rules : min support = 1%, min confidence = 30%</a:t>
+              <a:t>17 </a:t>
+            </a:r>
+            <a:r>
+              <a:rPr lang="en-US" dirty="0" smtClean="0"/>
+              <a:t>rules : min support = 1%, min confidence = </a:t>
+            </a:r>
+            <a:r>
+              <a:rPr lang="en-US" dirty="0" smtClean="0"/>
+              <a:t>50</a:t>
+            </a:r>
+            <a:r>
+              <a:rPr lang="en-US" dirty="0" smtClean="0"/>
+              <a:t>%</a:t>
             </a:r>
           </a:p>
           <a:p>
@@ -3689,15 +4202,9 @@
             <a:pPr lvl="1"/>
             <a:r>
               <a:rPr lang="en-US" dirty="0" smtClean="0"/>
-              <a:t>Matrix (3DMatrix)</a:t>
-            </a:r>
-          </a:p>
-          <a:p>
-            <a:pPr lvl="1"/>
-            <a:r>
-              <a:rPr lang="en-US" dirty="0" smtClean="0"/>
               <a:t>Grouped</a:t>
             </a:r>
+            <a:endParaRPr lang="en-US" dirty="0" smtClean="0"/>
           </a:p>
           <a:p>
             <a:pPr lvl="1"/>
@@ -3720,6 +4227,186 @@
     <p:extLst>
       <p:ext uri="{BB962C8B-B14F-4D97-AF65-F5344CB8AC3E}">
         <p14:creationId xmlns:p14="http://schemas.microsoft.com/office/powerpoint/2010/main" val="3059337594"/>
+      </p:ext>
+    </p:extLst>
+  </p:cSld>
+  <p:clrMapOvr>
+    <a:masterClrMapping/>
+  </p:clrMapOvr>
+</p:sld>
+</file>
+
+<file path=ppt/slides/slide7.xml><?xml version="1.0" encoding="utf-8"?>
+<p:sld xmlns:a="http://schemas.openxmlformats.org/drawingml/2006/main" xmlns:r="http://schemas.openxmlformats.org/officeDocument/2006/relationships" xmlns:p="http://schemas.openxmlformats.org/presentationml/2006/main">
+  <p:cSld>
+    <p:spTree>
+      <p:nvGrpSpPr>
+        <p:cNvPr id="1" name=""/>
+        <p:cNvGrpSpPr/>
+        <p:nvPr/>
+      </p:nvGrpSpPr>
+      <p:grpSpPr>
+        <a:xfrm>
+          <a:off x="0" y="0"/>
+          <a:ext cx="0" cy="0"/>
+          <a:chOff x="0" y="0"/>
+          <a:chExt cx="0" cy="0"/>
+        </a:xfrm>
+      </p:grpSpPr>
+      <p:pic>
+        <p:nvPicPr>
+          <p:cNvPr id="4" name="Content Placeholder 3" descr="scatter.png"/>
+          <p:cNvPicPr>
+            <a:picLocks noGrp="1" noChangeAspect="1"/>
+          </p:cNvPicPr>
+          <p:nvPr>
+            <p:ph idx="1"/>
+          </p:nvPr>
+        </p:nvPicPr>
+        <p:blipFill>
+          <a:blip r:embed="rId2">
+            <a:extLst>
+              <a:ext uri="{28A0092B-C50C-407E-A947-70E740481C1C}">
+                <a14:useLocalDpi xmlns:a14="http://schemas.microsoft.com/office/drawing/2010/main" val="0"/>
+              </a:ext>
+            </a:extLst>
+          </a:blip>
+          <a:srcRect l="-2883" r="-2883"/>
+          <a:stretch>
+            <a:fillRect/>
+          </a:stretch>
+        </p:blipFill>
+        <p:spPr>
+          <a:xfrm>
+            <a:off x="457200" y="386925"/>
+            <a:ext cx="8229600" cy="6121353"/>
+          </a:xfrm>
+        </p:spPr>
+      </p:pic>
+    </p:spTree>
+    <p:extLst>
+      <p:ext uri="{BB962C8B-B14F-4D97-AF65-F5344CB8AC3E}">
+        <p14:creationId xmlns:p14="http://schemas.microsoft.com/office/powerpoint/2010/main" val="1649712007"/>
+      </p:ext>
+    </p:extLst>
+  </p:cSld>
+  <p:clrMapOvr>
+    <a:masterClrMapping/>
+  </p:clrMapOvr>
+</p:sld>
+</file>
+
+<file path=ppt/slides/slide8.xml><?xml version="1.0" encoding="utf-8"?>
+<p:sld xmlns:a="http://schemas.openxmlformats.org/drawingml/2006/main" xmlns:r="http://schemas.openxmlformats.org/officeDocument/2006/relationships" xmlns:p="http://schemas.openxmlformats.org/presentationml/2006/main">
+  <p:cSld>
+    <p:spTree>
+      <p:nvGrpSpPr>
+        <p:cNvPr id="1" name=""/>
+        <p:cNvGrpSpPr/>
+        <p:nvPr/>
+      </p:nvGrpSpPr>
+      <p:grpSpPr>
+        <a:xfrm>
+          <a:off x="0" y="0"/>
+          <a:ext cx="0" cy="0"/>
+          <a:chOff x="0" y="0"/>
+          <a:chExt cx="0" cy="0"/>
+        </a:xfrm>
+      </p:grpSpPr>
+      <p:pic>
+        <p:nvPicPr>
+          <p:cNvPr id="4" name="Content Placeholder 3" descr="grouped.png"/>
+          <p:cNvPicPr>
+            <a:picLocks noGrp="1" noChangeAspect="1"/>
+          </p:cNvPicPr>
+          <p:nvPr>
+            <p:ph idx="1"/>
+          </p:nvPr>
+        </p:nvPicPr>
+        <p:blipFill>
+          <a:blip r:embed="rId2">
+            <a:extLst>
+              <a:ext uri="{28A0092B-C50C-407E-A947-70E740481C1C}">
+                <a14:useLocalDpi xmlns:a14="http://schemas.microsoft.com/office/drawing/2010/main" val="0"/>
+              </a:ext>
+            </a:extLst>
+          </a:blip>
+          <a:srcRect t="3412" b="3412"/>
+          <a:stretch>
+            <a:fillRect/>
+          </a:stretch>
+        </p:blipFill>
+        <p:spPr>
+          <a:xfrm>
+            <a:off x="457200" y="406400"/>
+            <a:ext cx="8229600" cy="6032500"/>
+          </a:xfrm>
+        </p:spPr>
+      </p:pic>
+    </p:spTree>
+    <p:extLst>
+      <p:ext uri="{BB962C8B-B14F-4D97-AF65-F5344CB8AC3E}">
+        <p14:creationId xmlns:p14="http://schemas.microsoft.com/office/powerpoint/2010/main" val="2222312049"/>
+      </p:ext>
+    </p:extLst>
+  </p:cSld>
+  <p:clrMapOvr>
+    <a:masterClrMapping/>
+  </p:clrMapOvr>
+</p:sld>
+</file>
+
+<file path=ppt/slides/slide9.xml><?xml version="1.0" encoding="utf-8"?>
+<p:sld xmlns:a="http://schemas.openxmlformats.org/drawingml/2006/main" xmlns:r="http://schemas.openxmlformats.org/officeDocument/2006/relationships" xmlns:p="http://schemas.openxmlformats.org/presentationml/2006/main">
+  <p:cSld>
+    <p:spTree>
+      <p:nvGrpSpPr>
+        <p:cNvPr id="1" name=""/>
+        <p:cNvGrpSpPr/>
+        <p:nvPr/>
+      </p:nvGrpSpPr>
+      <p:grpSpPr>
+        <a:xfrm>
+          <a:off x="0" y="0"/>
+          <a:ext cx="0" cy="0"/>
+          <a:chOff x="0" y="0"/>
+          <a:chExt cx="0" cy="0"/>
+        </a:xfrm>
+      </p:grpSpPr>
+      <p:pic>
+        <p:nvPicPr>
+          <p:cNvPr id="5" name="Content Placeholder 4" descr="graph.png"/>
+          <p:cNvPicPr>
+            <a:picLocks noGrp="1" noChangeAspect="1"/>
+          </p:cNvPicPr>
+          <p:nvPr>
+            <p:ph idx="1"/>
+          </p:nvPr>
+        </p:nvPicPr>
+        <p:blipFill>
+          <a:blip r:embed="rId2">
+            <a:extLst>
+              <a:ext uri="{28A0092B-C50C-407E-A947-70E740481C1C}">
+                <a14:useLocalDpi xmlns:a14="http://schemas.microsoft.com/office/drawing/2010/main" val="0"/>
+              </a:ext>
+            </a:extLst>
+          </a:blip>
+          <a:srcRect t="3645" b="3645"/>
+          <a:stretch>
+            <a:fillRect/>
+          </a:stretch>
+        </p:blipFill>
+        <p:spPr>
+          <a:xfrm>
+            <a:off x="457200" y="406400"/>
+            <a:ext cx="8229600" cy="6002338"/>
+          </a:xfrm>
+        </p:spPr>
+      </p:pic>
+    </p:spTree>
+    <p:extLst>
+      <p:ext uri="{BB962C8B-B14F-4D97-AF65-F5344CB8AC3E}">
+        <p14:creationId xmlns:p14="http://schemas.microsoft.com/office/powerpoint/2010/main" val="1816509880"/>
       </p:ext>
     </p:extLst>
   </p:cSld>

</xml_diff>

<commit_message>
Added write-up on association analysis and visualization for project report.
</commit_message>
<xml_diff>
--- a/R/Ai_Presentation.pptx
+++ b/R/Ai_Presentation.pptx
@@ -222,11 +222,11 @@
           <c:showBubbleSize val="0"/>
         </c:dLbls>
         <c:gapWidth val="150"/>
-        <c:axId val="2108307224"/>
-        <c:axId val="2107862472"/>
+        <c:axId val="-2128819720"/>
+        <c:axId val="-2133909064"/>
       </c:barChart>
       <c:catAx>
-        <c:axId val="2108307224"/>
+        <c:axId val="-2128819720"/>
         <c:scaling>
           <c:orientation val="minMax"/>
         </c:scaling>
@@ -259,7 +259,7 @@
         <c:majorTickMark val="none"/>
         <c:minorTickMark val="none"/>
         <c:tickLblPos val="nextTo"/>
-        <c:crossAx val="2107862472"/>
+        <c:crossAx val="-2133909064"/>
         <c:crosses val="autoZero"/>
         <c:auto val="1"/>
         <c:lblAlgn val="ctr"/>
@@ -267,7 +267,7 @@
         <c:noMultiLvlLbl val="0"/>
       </c:catAx>
       <c:valAx>
-        <c:axId val="2107862472"/>
+        <c:axId val="-2133909064"/>
         <c:scaling>
           <c:orientation val="minMax"/>
         </c:scaling>
@@ -302,7 +302,7 @@
         <c:majorTickMark val="out"/>
         <c:minorTickMark val="none"/>
         <c:tickLblPos val="nextTo"/>
-        <c:crossAx val="2108307224"/>
+        <c:crossAx val="-2128819720"/>
         <c:crosses val="autoZero"/>
         <c:crossBetween val="between"/>
       </c:valAx>
@@ -433,11 +433,11 @@
           <c:showBubbleSize val="0"/>
         </c:dLbls>
         <c:gapWidth val="150"/>
-        <c:axId val="-2132844344"/>
-        <c:axId val="2107651448"/>
+        <c:axId val="-2138034344"/>
+        <c:axId val="-2139737976"/>
       </c:barChart>
       <c:catAx>
-        <c:axId val="-2132844344"/>
+        <c:axId val="-2138034344"/>
         <c:scaling>
           <c:orientation val="minMax"/>
         </c:scaling>
@@ -465,7 +465,7 @@
         <c:majorTickMark val="none"/>
         <c:minorTickMark val="none"/>
         <c:tickLblPos val="nextTo"/>
-        <c:crossAx val="2107651448"/>
+        <c:crossAx val="-2139737976"/>
         <c:crosses val="autoZero"/>
         <c:auto val="1"/>
         <c:lblAlgn val="ctr"/>
@@ -473,7 +473,7 @@
         <c:noMultiLvlLbl val="0"/>
       </c:catAx>
       <c:valAx>
-        <c:axId val="2107651448"/>
+        <c:axId val="-2139737976"/>
         <c:scaling>
           <c:orientation val="minMax"/>
         </c:scaling>
@@ -503,7 +503,7 @@
         <c:majorTickMark val="out"/>
         <c:minorTickMark val="none"/>
         <c:tickLblPos val="nextTo"/>
-        <c:crossAx val="-2132844344"/>
+        <c:crossAx val="-2138034344"/>
         <c:crosses val="autoZero"/>
         <c:crossBetween val="between"/>
       </c:valAx>
@@ -3584,66 +3584,14 @@
           <a:p>
             <a:r>
               <a:rPr lang="en-US" dirty="0" smtClean="0"/>
-              <a:t>Page visits concentrates in </a:t>
-            </a:r>
+              <a:t>Page visits concentrates in 9 out of 17 categories (support threshold = 10%):</a:t>
+            </a:r>
+          </a:p>
+          <a:p>
+            <a:pPr lvl="1"/>
             <a:r>
               <a:rPr lang="en-US" dirty="0" smtClean="0"/>
-              <a:t>9 </a:t>
-            </a:r>
-            <a:r>
-              <a:rPr lang="en-US" dirty="0" smtClean="0"/>
-              <a:t>out of 17 categories (support threshold = </a:t>
-            </a:r>
-            <a:r>
-              <a:rPr lang="en-US" dirty="0" smtClean="0"/>
-              <a:t>10%</a:t>
-            </a:r>
-            <a:r>
-              <a:rPr lang="en-US" dirty="0" smtClean="0"/>
-              <a:t>):</a:t>
-            </a:r>
-          </a:p>
-          <a:p>
-            <a:pPr lvl="1"/>
-            <a:r>
-              <a:rPr lang="en-US" dirty="0" smtClean="0"/>
-              <a:t>Top 5 frequent </a:t>
-            </a:r>
-            <a:r>
-              <a:rPr lang="en-US" dirty="0" smtClean="0"/>
-              <a:t>categories: </a:t>
-            </a:r>
-            <a:r>
-              <a:rPr lang="en-US" dirty="0" smtClean="0"/>
-              <a:t>On</a:t>
-            </a:r>
-            <a:r>
-              <a:rPr lang="en-US" dirty="0" smtClean="0"/>
-              <a:t>-Air, News, </a:t>
-            </a:r>
-            <a:r>
-              <a:rPr lang="en-US" dirty="0" smtClean="0"/>
-              <a:t>Tech</a:t>
-            </a:r>
-            <a:r>
-              <a:rPr lang="en-US" dirty="0" smtClean="0"/>
-              <a:t>, </a:t>
-            </a:r>
-            <a:r>
-              <a:rPr lang="en-US" dirty="0" smtClean="0"/>
-              <a:t>Weather, Local </a:t>
-            </a:r>
-            <a:r>
-              <a:rPr lang="en-US" dirty="0" smtClean="0"/>
-              <a:t>Business.  (support &gt;= </a:t>
-            </a:r>
-            <a:r>
-              <a:rPr lang="en-US" dirty="0" smtClean="0"/>
-              <a:t>12%</a:t>
-            </a:r>
-            <a:r>
-              <a:rPr lang="en-US" dirty="0" smtClean="0"/>
-              <a:t>) </a:t>
+              <a:t>Top 5 frequent categories: On-Air, News, Tech, Weather, Local Business.  (support &gt;= 12%) </a:t>
             </a:r>
           </a:p>
           <a:p>
@@ -3663,37 +3611,21 @@
             <a:pPr lvl="1"/>
             <a:r>
               <a:rPr lang="en-US" dirty="0" smtClean="0"/>
-              <a:t>73% </a:t>
-            </a:r>
+              <a:t>73% with size = 1 </a:t>
+            </a:r>
+          </a:p>
+          <a:p>
+            <a:pPr lvl="1"/>
             <a:r>
               <a:rPr lang="en-US" dirty="0" smtClean="0"/>
-              <a:t>with size = 1 </a:t>
+              <a:t>18% with size = 2 </a:t>
             </a:r>
           </a:p>
           <a:p>
             <a:pPr lvl="1"/>
             <a:r>
               <a:rPr lang="en-US" dirty="0" smtClean="0"/>
-              <a:t>18% </a:t>
-            </a:r>
-            <a:r>
-              <a:rPr lang="en-US" dirty="0" smtClean="0"/>
-              <a:t>with size = 2 </a:t>
-            </a:r>
-          </a:p>
-          <a:p>
-            <a:pPr lvl="1"/>
-            <a:r>
-              <a:rPr lang="en-US" dirty="0" smtClean="0"/>
-              <a:t>  </a:t>
-            </a:r>
-            <a:r>
-              <a:rPr lang="en-US" dirty="0" smtClean="0"/>
-              <a:t>9% </a:t>
-            </a:r>
-            <a:r>
-              <a:rPr lang="en-US" dirty="0" smtClean="0"/>
-              <a:t>with size &gt;= 3</a:t>
+              <a:t>  9% with size &gt;= 3</a:t>
             </a:r>
           </a:p>
           <a:p>
@@ -3852,6 +3784,14 @@
   <p:clrMapOvr>
     <a:masterClrMapping/>
   </p:clrMapOvr>
+  <mc:AlternateContent xmlns:mc="http://schemas.openxmlformats.org/markup-compatibility/2006">
+    <mc:Choice xmlns:p14="http://schemas.microsoft.com/office/powerpoint/2010/main" Requires="p14">
+      <p:transition spd="slow" p14:dur="2000"/>
+    </mc:Choice>
+    <mc:Fallback>
+      <p:transition xmlns:p14="http://schemas.microsoft.com/office/powerpoint/2010/main" spd="slow"/>
+    </mc:Fallback>
+  </mc:AlternateContent>
 </p:sld>
 </file>
 
@@ -4170,19 +4110,7 @@
           <a:p>
             <a:r>
               <a:rPr lang="en-US" dirty="0" smtClean="0"/>
-              <a:t>17 </a:t>
-            </a:r>
-            <a:r>
-              <a:rPr lang="en-US" dirty="0" smtClean="0"/>
-              <a:t>rules : min support = 1%, min confidence = </a:t>
-            </a:r>
-            <a:r>
-              <a:rPr lang="en-US" dirty="0" smtClean="0"/>
-              <a:t>50</a:t>
-            </a:r>
-            <a:r>
-              <a:rPr lang="en-US" dirty="0" smtClean="0"/>
-              <a:t>%</a:t>
+              <a:t>17 rules : min support = 1%, min confidence = 50%</a:t>
             </a:r>
           </a:p>
           <a:p>
@@ -4204,7 +4132,6 @@
               <a:rPr lang="en-US" dirty="0" smtClean="0"/>
               <a:t>Grouped</a:t>
             </a:r>
-            <a:endParaRPr lang="en-US" dirty="0" smtClean="0"/>
           </a:p>
           <a:p>
             <a:pPr lvl="1"/>

</xml_diff>